<commit_message>
Create section 1 and 2
</commit_message>
<xml_diff>
--- a/CareDevTest/Presentation1.pptx
+++ b/CareDevTest/Presentation1.pptx
@@ -8,6 +8,7 @@
     <p:sldId id="256" r:id="rId2"/>
     <p:sldId id="257" r:id="rId3"/>
     <p:sldId id="258" r:id="rId4"/>
+    <p:sldId id="259" r:id="rId5"/>
   </p:sldIdLst>
   <p:sldSz cx="12192000" cy="6858000"/>
   <p:notesSz cx="6858000" cy="9144000"/>
@@ -106,6 +107,11 @@
       </a:defRPr>
     </a:lvl9pPr>
   </p:defaultTextStyle>
+  <p:extLst>
+    <p:ext uri="{EFAFB233-063F-42B5-8137-9DF3F51BA10A}">
+      <p15:sldGuideLst xmlns:p15="http://schemas.microsoft.com/office/powerpoint/2012/main"/>
+    </p:ext>
+  </p:extLst>
 </p:presentation>
 </file>
 
@@ -256,7 +262,7 @@
           <a:p>
             <a:fld id="{96720BA1-5975-4F2E-B3D1-5CFD37394317}" type="datetimeFigureOut">
               <a:rPr lang="en-US" smtClean="0"/>
-              <a:t>2/24/2022</a:t>
+              <a:t>2/25/2022</a:t>
             </a:fld>
             <a:endParaRPr lang="en-US"/>
           </a:p>
@@ -454,7 +460,7 @@
           <a:p>
             <a:fld id="{96720BA1-5975-4F2E-B3D1-5CFD37394317}" type="datetimeFigureOut">
               <a:rPr lang="en-US" smtClean="0"/>
-              <a:t>2/24/2022</a:t>
+              <a:t>2/25/2022</a:t>
             </a:fld>
             <a:endParaRPr lang="en-US"/>
           </a:p>
@@ -662,7 +668,7 @@
           <a:p>
             <a:fld id="{96720BA1-5975-4F2E-B3D1-5CFD37394317}" type="datetimeFigureOut">
               <a:rPr lang="en-US" smtClean="0"/>
-              <a:t>2/24/2022</a:t>
+              <a:t>2/25/2022</a:t>
             </a:fld>
             <a:endParaRPr lang="en-US"/>
           </a:p>
@@ -860,7 +866,7 @@
           <a:p>
             <a:fld id="{96720BA1-5975-4F2E-B3D1-5CFD37394317}" type="datetimeFigureOut">
               <a:rPr lang="en-US" smtClean="0"/>
-              <a:t>2/24/2022</a:t>
+              <a:t>2/25/2022</a:t>
             </a:fld>
             <a:endParaRPr lang="en-US"/>
           </a:p>
@@ -1135,7 +1141,7 @@
           <a:p>
             <a:fld id="{96720BA1-5975-4F2E-B3D1-5CFD37394317}" type="datetimeFigureOut">
               <a:rPr lang="en-US" smtClean="0"/>
-              <a:t>2/24/2022</a:t>
+              <a:t>2/25/2022</a:t>
             </a:fld>
             <a:endParaRPr lang="en-US"/>
           </a:p>
@@ -1400,7 +1406,7 @@
           <a:p>
             <a:fld id="{96720BA1-5975-4F2E-B3D1-5CFD37394317}" type="datetimeFigureOut">
               <a:rPr lang="en-US" smtClean="0"/>
-              <a:t>2/24/2022</a:t>
+              <a:t>2/25/2022</a:t>
             </a:fld>
             <a:endParaRPr lang="en-US"/>
           </a:p>
@@ -1812,7 +1818,7 @@
           <a:p>
             <a:fld id="{96720BA1-5975-4F2E-B3D1-5CFD37394317}" type="datetimeFigureOut">
               <a:rPr lang="en-US" smtClean="0"/>
-              <a:t>2/24/2022</a:t>
+              <a:t>2/25/2022</a:t>
             </a:fld>
             <a:endParaRPr lang="en-US"/>
           </a:p>
@@ -1953,7 +1959,7 @@
           <a:p>
             <a:fld id="{96720BA1-5975-4F2E-B3D1-5CFD37394317}" type="datetimeFigureOut">
               <a:rPr lang="en-US" smtClean="0"/>
-              <a:t>2/24/2022</a:t>
+              <a:t>2/25/2022</a:t>
             </a:fld>
             <a:endParaRPr lang="en-US"/>
           </a:p>
@@ -2066,7 +2072,7 @@
           <a:p>
             <a:fld id="{96720BA1-5975-4F2E-B3D1-5CFD37394317}" type="datetimeFigureOut">
               <a:rPr lang="en-US" smtClean="0"/>
-              <a:t>2/24/2022</a:t>
+              <a:t>2/25/2022</a:t>
             </a:fld>
             <a:endParaRPr lang="en-US"/>
           </a:p>
@@ -2377,7 +2383,7 @@
           <a:p>
             <a:fld id="{96720BA1-5975-4F2E-B3D1-5CFD37394317}" type="datetimeFigureOut">
               <a:rPr lang="en-US" smtClean="0"/>
-              <a:t>2/24/2022</a:t>
+              <a:t>2/25/2022</a:t>
             </a:fld>
             <a:endParaRPr lang="en-US"/>
           </a:p>
@@ -2665,7 +2671,7 @@
           <a:p>
             <a:fld id="{96720BA1-5975-4F2E-B3D1-5CFD37394317}" type="datetimeFigureOut">
               <a:rPr lang="en-US" smtClean="0"/>
-              <a:t>2/24/2022</a:t>
+              <a:t>2/25/2022</a:t>
             </a:fld>
             <a:endParaRPr lang="en-US"/>
           </a:p>
@@ -2906,7 +2912,7 @@
           <a:p>
             <a:fld id="{96720BA1-5975-4F2E-B3D1-5CFD37394317}" type="datetimeFigureOut">
               <a:rPr lang="en-US" smtClean="0"/>
-              <a:t>2/24/2022</a:t>
+              <a:t>2/25/2022</a:t>
             </a:fld>
             <a:endParaRPr lang="en-US"/>
           </a:p>
@@ -3583,6 +3589,116 @@
 </p:sld>
 </file>
 
+<file path=ppt/slides/slide4.xml><?xml version="1.0" encoding="utf-8"?>
+<p:sld xmlns:a="http://schemas.openxmlformats.org/drawingml/2006/main" xmlns:r="http://schemas.openxmlformats.org/officeDocument/2006/relationships" xmlns:p="http://schemas.openxmlformats.org/presentationml/2006/main">
+  <p:cSld>
+    <p:spTree>
+      <p:nvGrpSpPr>
+        <p:cNvPr id="1" name=""/>
+        <p:cNvGrpSpPr/>
+        <p:nvPr/>
+      </p:nvGrpSpPr>
+      <p:grpSpPr>
+        <a:xfrm>
+          <a:off x="0" y="0"/>
+          <a:ext cx="0" cy="0"/>
+          <a:chOff x="0" y="0"/>
+          <a:chExt cx="0" cy="0"/>
+        </a:xfrm>
+      </p:grpSpPr>
+      <p:pic>
+        <p:nvPicPr>
+          <p:cNvPr id="5" name="Picture 4" descr="Shape&#10;&#10;Description automatically generated with medium confidence">
+            <a:extLst>
+              <a:ext uri="{FF2B5EF4-FFF2-40B4-BE49-F238E27FC236}">
+                <a16:creationId xmlns:a16="http://schemas.microsoft.com/office/drawing/2014/main" id="{D0546E3F-F99E-4132-AD24-F8D69FC36F1F}"/>
+              </a:ext>
+            </a:extLst>
+          </p:cNvPr>
+          <p:cNvPicPr>
+            <a:picLocks noChangeAspect="1"/>
+          </p:cNvPicPr>
+          <p:nvPr/>
+        </p:nvPicPr>
+        <p:blipFill rotWithShape="1">
+          <a:blip r:embed="rId2">
+            <a:extLst>
+              <a:ext uri="{BEBA8EAE-BF5A-486C-A8C5-ECC9F3942E4B}">
+                <a14:imgProps xmlns:a14="http://schemas.microsoft.com/office/drawing/2010/main">
+                  <a14:imgLayer r:embed="rId3">
+                    <a14:imgEffect>
+                      <a14:sharpenSoften amount="25000"/>
+                    </a14:imgEffect>
+                  </a14:imgLayer>
+                </a14:imgProps>
+              </a:ext>
+              <a:ext uri="{28A0092B-C50C-407E-A947-70E740481C1C}">
+                <a14:useLocalDpi xmlns:a14="http://schemas.microsoft.com/office/drawing/2010/main" val="0"/>
+              </a:ext>
+            </a:extLst>
+          </a:blip>
+          <a:srcRect/>
+          <a:stretch/>
+        </p:blipFill>
+        <p:spPr>
+          <a:xfrm>
+            <a:off x="4465674" y="423655"/>
+            <a:ext cx="7591397" cy="6242671"/>
+          </a:xfrm>
+          <a:prstGeom prst="rect">
+            <a:avLst/>
+          </a:prstGeom>
+        </p:spPr>
+      </p:pic>
+      <p:pic>
+        <p:nvPicPr>
+          <p:cNvPr id="7" name="Picture 6" descr="Shape&#10;&#10;Description automatically generated">
+            <a:extLst>
+              <a:ext uri="{FF2B5EF4-FFF2-40B4-BE49-F238E27FC236}">
+                <a16:creationId xmlns:a16="http://schemas.microsoft.com/office/drawing/2014/main" id="{6DBBB149-F9D0-4902-A6CC-88A2DDA0FA15}"/>
+              </a:ext>
+            </a:extLst>
+          </p:cNvPr>
+          <p:cNvPicPr>
+            <a:picLocks noChangeAspect="1"/>
+          </p:cNvPicPr>
+          <p:nvPr/>
+        </p:nvPicPr>
+        <p:blipFill>
+          <a:blip r:embed="rId4">
+            <a:extLst>
+              <a:ext uri="{28A0092B-C50C-407E-A947-70E740481C1C}">
+                <a14:useLocalDpi xmlns:a14="http://schemas.microsoft.com/office/drawing/2010/main" val="0"/>
+              </a:ext>
+            </a:extLst>
+          </a:blip>
+          <a:stretch>
+            <a:fillRect/>
+          </a:stretch>
+        </p:blipFill>
+        <p:spPr>
+          <a:xfrm>
+            <a:off x="0" y="3429000"/>
+            <a:ext cx="662306" cy="1368766"/>
+          </a:xfrm>
+          <a:prstGeom prst="rect">
+            <a:avLst/>
+          </a:prstGeom>
+        </p:spPr>
+      </p:pic>
+    </p:spTree>
+    <p:extLst>
+      <p:ext uri="{BB962C8B-B14F-4D97-AF65-F5344CB8AC3E}">
+        <p14:creationId xmlns:p14="http://schemas.microsoft.com/office/powerpoint/2010/main" val="3646935832"/>
+      </p:ext>
+    </p:extLst>
+  </p:cSld>
+  <p:clrMapOvr>
+    <a:masterClrMapping/>
+  </p:clrMapOvr>
+</p:sld>
+</file>
+
 <file path=ppt/theme/theme1.xml><?xml version="1.0" encoding="utf-8"?>
 <a:theme xmlns:a="http://schemas.openxmlformats.org/drawingml/2006/main" name="Office Theme">
   <a:themeElements>

</xml_diff>

<commit_message>
Update footer and section-two and buttons
Update footer and section 2 and buttons style
</commit_message>
<xml_diff>
--- a/CareDevTest/Presentation1.pptx
+++ b/CareDevTest/Presentation1.pptx
@@ -262,7 +262,7 @@
           <a:p>
             <a:fld id="{96720BA1-5975-4F2E-B3D1-5CFD37394317}" type="datetimeFigureOut">
               <a:rPr lang="en-US" smtClean="0"/>
-              <a:t>2/25/2022</a:t>
+              <a:t>2/28/2022</a:t>
             </a:fld>
             <a:endParaRPr lang="en-US"/>
           </a:p>
@@ -460,7 +460,7 @@
           <a:p>
             <a:fld id="{96720BA1-5975-4F2E-B3D1-5CFD37394317}" type="datetimeFigureOut">
               <a:rPr lang="en-US" smtClean="0"/>
-              <a:t>2/25/2022</a:t>
+              <a:t>2/28/2022</a:t>
             </a:fld>
             <a:endParaRPr lang="en-US"/>
           </a:p>
@@ -668,7 +668,7 @@
           <a:p>
             <a:fld id="{96720BA1-5975-4F2E-B3D1-5CFD37394317}" type="datetimeFigureOut">
               <a:rPr lang="en-US" smtClean="0"/>
-              <a:t>2/25/2022</a:t>
+              <a:t>2/28/2022</a:t>
             </a:fld>
             <a:endParaRPr lang="en-US"/>
           </a:p>
@@ -866,7 +866,7 @@
           <a:p>
             <a:fld id="{96720BA1-5975-4F2E-B3D1-5CFD37394317}" type="datetimeFigureOut">
               <a:rPr lang="en-US" smtClean="0"/>
-              <a:t>2/25/2022</a:t>
+              <a:t>2/28/2022</a:t>
             </a:fld>
             <a:endParaRPr lang="en-US"/>
           </a:p>
@@ -1141,7 +1141,7 @@
           <a:p>
             <a:fld id="{96720BA1-5975-4F2E-B3D1-5CFD37394317}" type="datetimeFigureOut">
               <a:rPr lang="en-US" smtClean="0"/>
-              <a:t>2/25/2022</a:t>
+              <a:t>2/28/2022</a:t>
             </a:fld>
             <a:endParaRPr lang="en-US"/>
           </a:p>
@@ -1406,7 +1406,7 @@
           <a:p>
             <a:fld id="{96720BA1-5975-4F2E-B3D1-5CFD37394317}" type="datetimeFigureOut">
               <a:rPr lang="en-US" smtClean="0"/>
-              <a:t>2/25/2022</a:t>
+              <a:t>2/28/2022</a:t>
             </a:fld>
             <a:endParaRPr lang="en-US"/>
           </a:p>
@@ -1818,7 +1818,7 @@
           <a:p>
             <a:fld id="{96720BA1-5975-4F2E-B3D1-5CFD37394317}" type="datetimeFigureOut">
               <a:rPr lang="en-US" smtClean="0"/>
-              <a:t>2/25/2022</a:t>
+              <a:t>2/28/2022</a:t>
             </a:fld>
             <a:endParaRPr lang="en-US"/>
           </a:p>
@@ -1959,7 +1959,7 @@
           <a:p>
             <a:fld id="{96720BA1-5975-4F2E-B3D1-5CFD37394317}" type="datetimeFigureOut">
               <a:rPr lang="en-US" smtClean="0"/>
-              <a:t>2/25/2022</a:t>
+              <a:t>2/28/2022</a:t>
             </a:fld>
             <a:endParaRPr lang="en-US"/>
           </a:p>
@@ -2072,7 +2072,7 @@
           <a:p>
             <a:fld id="{96720BA1-5975-4F2E-B3D1-5CFD37394317}" type="datetimeFigureOut">
               <a:rPr lang="en-US" smtClean="0"/>
-              <a:t>2/25/2022</a:t>
+              <a:t>2/28/2022</a:t>
             </a:fld>
             <a:endParaRPr lang="en-US"/>
           </a:p>
@@ -2383,7 +2383,7 @@
           <a:p>
             <a:fld id="{96720BA1-5975-4F2E-B3D1-5CFD37394317}" type="datetimeFigureOut">
               <a:rPr lang="en-US" smtClean="0"/>
-              <a:t>2/25/2022</a:t>
+              <a:t>2/28/2022</a:t>
             </a:fld>
             <a:endParaRPr lang="en-US"/>
           </a:p>
@@ -2671,7 +2671,7 @@
           <a:p>
             <a:fld id="{96720BA1-5975-4F2E-B3D1-5CFD37394317}" type="datetimeFigureOut">
               <a:rPr lang="en-US" smtClean="0"/>
-              <a:t>2/25/2022</a:t>
+              <a:t>2/28/2022</a:t>
             </a:fld>
             <a:endParaRPr lang="en-US"/>
           </a:p>
@@ -2912,7 +2912,7 @@
           <a:p>
             <a:fld id="{96720BA1-5975-4F2E-B3D1-5CFD37394317}" type="datetimeFigureOut">
               <a:rPr lang="en-US" smtClean="0"/>
-              <a:t>2/25/2022</a:t>
+              <a:t>2/28/2022</a:t>
             </a:fld>
             <a:endParaRPr lang="en-US"/>
           </a:p>
@@ -3401,6 +3401,194 @@
           </a:prstGeom>
         </p:spPr>
       </p:pic>
+      <p:sp>
+        <p:nvSpPr>
+          <p:cNvPr id="2" name="Rectangle 1">
+            <a:extLst>
+              <a:ext uri="{FF2B5EF4-FFF2-40B4-BE49-F238E27FC236}">
+                <a16:creationId xmlns:a16="http://schemas.microsoft.com/office/drawing/2014/main" id="{32C06E8F-EF86-4318-B5B4-70DA574D2755}"/>
+              </a:ext>
+            </a:extLst>
+          </p:cNvPr>
+          <p:cNvSpPr/>
+          <p:nvPr/>
+        </p:nvSpPr>
+        <p:spPr>
+          <a:xfrm>
+            <a:off x="2617365" y="1107347"/>
+            <a:ext cx="1585519" cy="1468073"/>
+          </a:xfrm>
+          <a:prstGeom prst="rect">
+            <a:avLst/>
+          </a:prstGeom>
+          <a:solidFill>
+            <a:srgbClr val="37E1A1"/>
+          </a:solidFill>
+        </p:spPr>
+        <p:style>
+          <a:lnRef idx="2">
+            <a:schemeClr val="accent1">
+              <a:shade val="50000"/>
+            </a:schemeClr>
+          </a:lnRef>
+          <a:fillRef idx="1">
+            <a:schemeClr val="accent1"/>
+          </a:fillRef>
+          <a:effectRef idx="0">
+            <a:schemeClr val="accent1"/>
+          </a:effectRef>
+          <a:fontRef idx="minor">
+            <a:schemeClr val="lt1"/>
+          </a:fontRef>
+        </p:style>
+        <p:txBody>
+          <a:bodyPr rtlCol="0" anchor="ctr"/>
+          <a:lstStyle/>
+          <a:p>
+            <a:pPr algn="ctr"/>
+            <a:endParaRPr lang="en-US"/>
+          </a:p>
+        </p:txBody>
+      </p:sp>
+      <p:sp>
+        <p:nvSpPr>
+          <p:cNvPr id="6" name="Rectangle 5">
+            <a:extLst>
+              <a:ext uri="{FF2B5EF4-FFF2-40B4-BE49-F238E27FC236}">
+                <a16:creationId xmlns:a16="http://schemas.microsoft.com/office/drawing/2014/main" id="{A5336341-A2B7-482E-B225-31BB13027801}"/>
+              </a:ext>
+            </a:extLst>
+          </p:cNvPr>
+          <p:cNvSpPr/>
+          <p:nvPr/>
+        </p:nvSpPr>
+        <p:spPr>
+          <a:xfrm>
+            <a:off x="2617365" y="2814508"/>
+            <a:ext cx="1585519" cy="1468073"/>
+          </a:xfrm>
+          <a:prstGeom prst="rect">
+            <a:avLst/>
+          </a:prstGeom>
+          <a:solidFill>
+            <a:srgbClr val="662483"/>
+          </a:solidFill>
+        </p:spPr>
+        <p:style>
+          <a:lnRef idx="2">
+            <a:schemeClr val="accent1">
+              <a:shade val="50000"/>
+            </a:schemeClr>
+          </a:lnRef>
+          <a:fillRef idx="1">
+            <a:schemeClr val="accent1"/>
+          </a:fillRef>
+          <a:effectRef idx="0">
+            <a:schemeClr val="accent1"/>
+          </a:effectRef>
+          <a:fontRef idx="minor">
+            <a:schemeClr val="lt1"/>
+          </a:fontRef>
+        </p:style>
+        <p:txBody>
+          <a:bodyPr rtlCol="0" anchor="ctr"/>
+          <a:lstStyle/>
+          <a:p>
+            <a:pPr algn="ctr"/>
+            <a:endParaRPr lang="en-US"/>
+          </a:p>
+        </p:txBody>
+      </p:sp>
+      <p:pic>
+        <p:nvPicPr>
+          <p:cNvPr id="4" name="Picture 3" descr="Icon&#10;&#10;Description automatically generated with low confidence">
+            <a:extLst>
+              <a:ext uri="{FF2B5EF4-FFF2-40B4-BE49-F238E27FC236}">
+                <a16:creationId xmlns:a16="http://schemas.microsoft.com/office/drawing/2014/main" id="{F0D8E66E-1A67-4C72-A2D8-EA01FE473564}"/>
+              </a:ext>
+            </a:extLst>
+          </p:cNvPr>
+          <p:cNvPicPr>
+            <a:picLocks noChangeAspect="1"/>
+          </p:cNvPicPr>
+          <p:nvPr/>
+        </p:nvPicPr>
+        <p:blipFill>
+          <a:blip r:embed="rId4">
+            <a:extLst>
+              <a:ext uri="{28A0092B-C50C-407E-A947-70E740481C1C}">
+                <a14:useLocalDpi xmlns:a14="http://schemas.microsoft.com/office/drawing/2010/main" val="0"/>
+              </a:ext>
+            </a:extLst>
+          </a:blip>
+          <a:stretch>
+            <a:fillRect/>
+          </a:stretch>
+        </p:blipFill>
+        <p:spPr>
+          <a:xfrm>
+            <a:off x="5133975" y="2371725"/>
+            <a:ext cx="1924050" cy="2114550"/>
+          </a:xfrm>
+          <a:prstGeom prst="rect">
+            <a:avLst/>
+          </a:prstGeom>
+        </p:spPr>
+      </p:pic>
+      <p:sp>
+        <p:nvSpPr>
+          <p:cNvPr id="8" name="Rectangle 7">
+            <a:extLst>
+              <a:ext uri="{FF2B5EF4-FFF2-40B4-BE49-F238E27FC236}">
+                <a16:creationId xmlns:a16="http://schemas.microsoft.com/office/drawing/2014/main" id="{CD7B0683-E8FD-4E5C-B3E9-01ABE437D9E2}"/>
+              </a:ext>
+            </a:extLst>
+          </p:cNvPr>
+          <p:cNvSpPr/>
+          <p:nvPr/>
+        </p:nvSpPr>
+        <p:spPr>
+          <a:xfrm>
+            <a:off x="2619271" y="4486275"/>
+            <a:ext cx="1585519" cy="1468073"/>
+          </a:xfrm>
+          <a:prstGeom prst="rect">
+            <a:avLst/>
+          </a:prstGeom>
+          <a:solidFill>
+            <a:srgbClr val="F0FF02"/>
+          </a:solidFill>
+          <a:ln>
+            <a:solidFill>
+              <a:srgbClr val="662483"/>
+            </a:solidFill>
+          </a:ln>
+        </p:spPr>
+        <p:style>
+          <a:lnRef idx="2">
+            <a:schemeClr val="accent1">
+              <a:shade val="50000"/>
+            </a:schemeClr>
+          </a:lnRef>
+          <a:fillRef idx="1">
+            <a:schemeClr val="accent1"/>
+          </a:fillRef>
+          <a:effectRef idx="0">
+            <a:schemeClr val="accent1"/>
+          </a:effectRef>
+          <a:fontRef idx="minor">
+            <a:schemeClr val="lt1"/>
+          </a:fontRef>
+        </p:style>
+        <p:txBody>
+          <a:bodyPr rtlCol="0" anchor="ctr"/>
+          <a:lstStyle/>
+          <a:p>
+            <a:pPr algn="ctr"/>
+            <a:endParaRPr lang="en-US"/>
+          </a:p>
+        </p:txBody>
+      </p:sp>
     </p:spTree>
     <p:extLst>
       <p:ext uri="{BB962C8B-B14F-4D97-AF65-F5344CB8AC3E}">

</xml_diff>